<commit_message>
Updated and Added Project Files
</commit_message>
<xml_diff>
--- a/Group Project/Willson_BacchusWinery_Milestone4.pptx
+++ b/Group Project/Willson_BacchusWinery_Milestone4.pptx
@@ -213,10 +213,87 @@
   <pc:docChgLst>
     <pc:chgData name="Andrew Stiles" userId="08e60b2c122a7bf5" providerId="LiveId" clId="{7C8DC619-65C6-453F-B11D-A6DC21B3864C}"/>
     <pc:docChg chg="custSel modSld">
-      <pc:chgData name="Andrew Stiles" userId="08e60b2c122a7bf5" providerId="LiveId" clId="{7C8DC619-65C6-453F-B11D-A6DC21B3864C}" dt="2025-03-02T04:05:48.323" v="153" actId="20577"/>
+      <pc:chgData name="Andrew Stiles" userId="08e60b2c122a7bf5" providerId="LiveId" clId="{7C8DC619-65C6-453F-B11D-A6DC21B3864C}" dt="2025-03-10T00:30:23.737" v="463" actId="255"/>
       <pc:docMkLst>
         <pc:docMk/>
       </pc:docMkLst>
+      <pc:sldChg chg="modSp mod">
+        <pc:chgData name="Andrew Stiles" userId="08e60b2c122a7bf5" providerId="LiveId" clId="{7C8DC619-65C6-453F-B11D-A6DC21B3864C}" dt="2025-03-10T00:29:43.431" v="456" actId="1076"/>
+        <pc:sldMkLst>
+          <pc:docMk/>
+          <pc:sldMk cId="1637310646" sldId="258"/>
+        </pc:sldMkLst>
+        <pc:spChg chg="mod">
+          <ac:chgData name="Andrew Stiles" userId="08e60b2c122a7bf5" providerId="LiveId" clId="{7C8DC619-65C6-453F-B11D-A6DC21B3864C}" dt="2025-03-10T00:29:43.431" v="456" actId="1076"/>
+          <ac:spMkLst>
+            <pc:docMk/>
+            <pc:sldMk cId="1637310646" sldId="258"/>
+            <ac:spMk id="2" creationId="{00000000-0000-0000-0000-000000000000}"/>
+          </ac:spMkLst>
+        </pc:spChg>
+        <pc:spChg chg="mod">
+          <ac:chgData name="Andrew Stiles" userId="08e60b2c122a7bf5" providerId="LiveId" clId="{7C8DC619-65C6-453F-B11D-A6DC21B3864C}" dt="2025-03-10T00:24:04.931" v="219" actId="20577"/>
+          <ac:spMkLst>
+            <pc:docMk/>
+            <pc:sldMk cId="1637310646" sldId="258"/>
+            <ac:spMk id="3" creationId="{00000000-0000-0000-0000-000000000000}"/>
+          </ac:spMkLst>
+        </pc:spChg>
+      </pc:sldChg>
+      <pc:sldChg chg="modSp mod modAnim">
+        <pc:chgData name="Andrew Stiles" userId="08e60b2c122a7bf5" providerId="LiveId" clId="{7C8DC619-65C6-453F-B11D-A6DC21B3864C}" dt="2025-03-10T00:29:35.369" v="455" actId="1076"/>
+        <pc:sldMkLst>
+          <pc:docMk/>
+          <pc:sldMk cId="3388139804" sldId="261"/>
+        </pc:sldMkLst>
+        <pc:spChg chg="mod">
+          <ac:chgData name="Andrew Stiles" userId="08e60b2c122a7bf5" providerId="LiveId" clId="{7C8DC619-65C6-453F-B11D-A6DC21B3864C}" dt="2025-03-10T00:29:35.369" v="455" actId="1076"/>
+          <ac:spMkLst>
+            <pc:docMk/>
+            <pc:sldMk cId="3388139804" sldId="261"/>
+            <ac:spMk id="2" creationId="{00000000-0000-0000-0000-000000000000}"/>
+          </ac:spMkLst>
+        </pc:spChg>
+        <pc:spChg chg="mod">
+          <ac:chgData name="Andrew Stiles" userId="08e60b2c122a7bf5" providerId="LiveId" clId="{7C8DC619-65C6-453F-B11D-A6DC21B3864C}" dt="2025-03-10T00:28:56.907" v="450" actId="27636"/>
+          <ac:spMkLst>
+            <pc:docMk/>
+            <pc:sldMk cId="3388139804" sldId="261"/>
+            <ac:spMk id="3" creationId="{00000000-0000-0000-0000-000000000000}"/>
+          </ac:spMkLst>
+        </pc:spChg>
+      </pc:sldChg>
+      <pc:sldChg chg="modSp mod">
+        <pc:chgData name="Andrew Stiles" userId="08e60b2c122a7bf5" providerId="LiveId" clId="{7C8DC619-65C6-453F-B11D-A6DC21B3864C}" dt="2025-03-10T00:30:23.737" v="463" actId="255"/>
+        <pc:sldMkLst>
+          <pc:docMk/>
+          <pc:sldMk cId="546413047" sldId="279"/>
+        </pc:sldMkLst>
+        <pc:spChg chg="mod">
+          <ac:chgData name="Andrew Stiles" userId="08e60b2c122a7bf5" providerId="LiveId" clId="{7C8DC619-65C6-453F-B11D-A6DC21B3864C}" dt="2025-03-10T00:29:58.703" v="457" actId="1076"/>
+          <ac:spMkLst>
+            <pc:docMk/>
+            <pc:sldMk cId="546413047" sldId="279"/>
+            <ac:spMk id="2" creationId="{00000000-0000-0000-0000-000000000000}"/>
+          </ac:spMkLst>
+        </pc:spChg>
+        <pc:spChg chg="mod">
+          <ac:chgData name="Andrew Stiles" userId="08e60b2c122a7bf5" providerId="LiveId" clId="{7C8DC619-65C6-453F-B11D-A6DC21B3864C}" dt="2025-03-10T00:30:11.785" v="460" actId="1076"/>
+          <ac:spMkLst>
+            <pc:docMk/>
+            <pc:sldMk cId="546413047" sldId="279"/>
+            <ac:spMk id="10" creationId="{85458D84-0BA2-9DB5-50D6-6379AE92216E}"/>
+          </ac:spMkLst>
+        </pc:spChg>
+        <pc:spChg chg="mod">
+          <ac:chgData name="Andrew Stiles" userId="08e60b2c122a7bf5" providerId="LiveId" clId="{7C8DC619-65C6-453F-B11D-A6DC21B3864C}" dt="2025-03-10T00:30:23.737" v="463" actId="255"/>
+          <ac:spMkLst>
+            <pc:docMk/>
+            <pc:sldMk cId="546413047" sldId="279"/>
+            <ac:spMk id="12" creationId="{E043C361-D9F6-C637-ADB7-F1672DAAEDA4}"/>
+          </ac:spMkLst>
+        </pc:spChg>
+      </pc:sldChg>
       <pc:sldChg chg="modSp mod modAnim">
         <pc:chgData name="Andrew Stiles" userId="08e60b2c122a7bf5" providerId="LiveId" clId="{7C8DC619-65C6-453F-B11D-A6DC21B3864C}" dt="2025-03-02T04:05:48.323" v="153" actId="20577"/>
         <pc:sldMkLst>
@@ -237,6 +314,29 @@
             <pc:docMk/>
             <pc:sldMk cId="1808901961" sldId="282"/>
             <ac:spMk id="19" creationId="{9B989A75-8BF6-6DE9-1AB9-424401DB3926}"/>
+          </ac:spMkLst>
+        </pc:spChg>
+      </pc:sldChg>
+      <pc:sldChg chg="modSp mod modAnim">
+        <pc:chgData name="Andrew Stiles" userId="08e60b2c122a7bf5" providerId="LiveId" clId="{7C8DC619-65C6-453F-B11D-A6DC21B3864C}" dt="2025-03-10T00:29:23.709" v="454" actId="14100"/>
+        <pc:sldMkLst>
+          <pc:docMk/>
+          <pc:sldMk cId="2728778386" sldId="286"/>
+        </pc:sldMkLst>
+        <pc:spChg chg="mod">
+          <ac:chgData name="Andrew Stiles" userId="08e60b2c122a7bf5" providerId="LiveId" clId="{7C8DC619-65C6-453F-B11D-A6DC21B3864C}" dt="2025-03-10T00:28:47.121" v="447" actId="1076"/>
+          <ac:spMkLst>
+            <pc:docMk/>
+            <pc:sldMk cId="2728778386" sldId="286"/>
+            <ac:spMk id="2" creationId="{00000000-0000-0000-0000-000000000000}"/>
+          </ac:spMkLst>
+        </pc:spChg>
+        <pc:spChg chg="mod">
+          <ac:chgData name="Andrew Stiles" userId="08e60b2c122a7bf5" providerId="LiveId" clId="{7C8DC619-65C6-453F-B11D-A6DC21B3864C}" dt="2025-03-10T00:29:23.709" v="454" actId="14100"/>
+          <ac:spMkLst>
+            <pc:docMk/>
+            <pc:sldMk cId="2728778386" sldId="286"/>
+            <ac:spMk id="57" creationId="{1605DBE3-7F65-9190-B2E5-E61B7FA5C10F}"/>
           </ac:spMkLst>
         </pc:spChg>
       </pc:sldChg>
@@ -327,7 +427,7 @@
           <a:p>
             <a:fld id="{24CE221E-83ED-4F6C-BA5F-3F9E6FDB6953}" type="datetimeFigureOut">
               <a:rPr lang="en-US"/>
-              <a:t>3/1/2025</a:t>
+              <a:t>3/9/2025</a:t>
             </a:fld>
             <a:endParaRPr dirty="0"/>
           </a:p>
@@ -492,7 +592,7 @@
           <a:p>
             <a:fld id="{97853E5F-CE67-483C-A264-F17AC70E9CA2}" type="datetimeFigureOut">
               <a:rPr lang="en-US"/>
-              <a:t>3/1/2025</a:t>
+              <a:t>3/9/2025</a:t>
             </a:fld>
             <a:endParaRPr dirty="0"/>
           </a:p>
@@ -10076,15 +10176,7 @@
           <a:p>
             <a:r>
               <a:rPr lang="en-US" dirty="0"/>
-              <a:t>Andrew created this presentation, and edited some entries into the database, with feedback and suggestions from Julio and James. Together, we designed an efficient system to support </a:t>
-            </a:r>
-            <a:r>
-              <a:rPr lang="en-US"/>
-              <a:t>this winery’s </a:t>
-            </a:r>
-            <a:r>
-              <a:rPr lang="en-US" dirty="0"/>
-              <a:t>operations and reporting.</a:t>
+              <a:t>Andrew created this presentation, and edited some entries into the database, with feedback and suggestions from Julio and James. Together, we designed an efficient system to support this winery’s operations and reporting.</a:t>
             </a:r>
             <a:endParaRPr lang="en-US" b="1" dirty="0"/>
           </a:p>
@@ -11863,7 +11955,7 @@
         </p:nvSpPr>
         <p:spPr>
           <a:xfrm>
-            <a:off x="894554" y="673378"/>
+            <a:off x="441629" y="568912"/>
             <a:ext cx="4895058" cy="1447800"/>
           </a:xfrm>
         </p:spPr>
@@ -11903,8 +11995,8 @@
         </p:nvSpPr>
         <p:spPr bwMode="auto">
           <a:xfrm>
-            <a:off x="1522412" y="2666762"/>
-            <a:ext cx="3962400" cy="3200876"/>
+            <a:off x="1065212" y="2628662"/>
+            <a:ext cx="4114800" cy="3200876"/>
           </a:xfrm>
           <a:prstGeom prst="rect">
             <a:avLst/>
@@ -12418,8 +12510,8 @@
         </p:blipFill>
         <p:spPr>
           <a:xfrm>
-            <a:off x="5789612" y="2527300"/>
-            <a:ext cx="5580857" cy="3692386"/>
+            <a:off x="4799012" y="1828800"/>
+            <a:ext cx="7255866" cy="4800600"/>
           </a:xfrm>
           <a:prstGeom prst="rect">
             <a:avLst/>
@@ -12452,8 +12544,8 @@
         </p:nvSpPr>
         <p:spPr bwMode="auto">
           <a:xfrm>
-            <a:off x="6856412" y="685800"/>
-            <a:ext cx="3810000" cy="1877437"/>
+            <a:off x="6475412" y="540986"/>
+            <a:ext cx="4419600" cy="1215717"/>
           </a:xfrm>
           <a:prstGeom prst="rect">
             <a:avLst/>
@@ -12732,7 +12824,7 @@
               <a:buSzTx/>
             </a:pPr>
             <a:r>
-              <a:rPr lang="en-US" altLang="en-US" sz="2000" dirty="0">
+              <a:rPr lang="en-US" altLang="en-US" sz="1200" dirty="0">
                 <a:solidFill>
                   <a:schemeClr val="tx1"/>
                 </a:solidFill>
@@ -12777,7 +12869,7 @@
               <a:buSzTx/>
             </a:pPr>
             <a:r>
-              <a:rPr lang="en-US" altLang="en-US" sz="1200" b="0" dirty="0">
+              <a:rPr lang="en-US" altLang="en-US" sz="1100" b="0" dirty="0">
                 <a:solidFill>
                   <a:schemeClr val="tx1"/>
                 </a:solidFill>
@@ -14099,7 +14191,7 @@
         </p:nvSpPr>
         <p:spPr>
           <a:xfrm>
-            <a:off x="1293812" y="609600"/>
+            <a:off x="1185544" y="812800"/>
             <a:ext cx="8534400" cy="609600"/>
           </a:xfrm>
         </p:spPr>
@@ -14138,7 +14230,7 @@
         </p:spPr>
         <p:txBody>
           <a:bodyPr vert="horz" lIns="91440" tIns="45720" rIns="91440" bIns="45720" rtlCol="0" anchor="t">
-            <a:normAutofit/>
+            <a:normAutofit lnSpcReduction="10000"/>
           </a:bodyPr>
           <a:lstStyle/>
           <a:p>
@@ -14176,7 +14268,7 @@
             <a:pPr marL="457200" lvl="1"/>
             <a:r>
               <a:rPr lang="en-US" sz="1500" dirty="0"/>
-              <a:t>Number of delayed days</a:t>
+              <a:t>Number of delayed days. Negative Numbers indicate early arrival.</a:t>
             </a:r>
           </a:p>
           <a:p>
@@ -15484,7 +15576,7 @@
         </p:nvSpPr>
         <p:spPr>
           <a:xfrm>
-            <a:off x="1293812" y="609600"/>
+            <a:off x="989012" y="703457"/>
             <a:ext cx="6096000" cy="609600"/>
           </a:xfrm>
         </p:spPr>
@@ -15517,8 +15609,8 @@
         </p:nvSpPr>
         <p:spPr>
           <a:xfrm>
-            <a:off x="6170612" y="1600200"/>
-            <a:ext cx="5867400" cy="4267200"/>
+            <a:off x="6170612" y="1600199"/>
+            <a:ext cx="5791200" cy="4553171"/>
           </a:xfrm>
         </p:spPr>
         <p:txBody>
@@ -15548,6 +15640,15 @@
               <a:t>What It Shows:</a:t>
             </a:r>
             <a:endParaRPr lang="en-US" dirty="0"/>
+          </a:p>
+          <a:p>
+            <a:pPr marL="457200" lvl="1" indent="0">
+              <a:buNone/>
+            </a:pPr>
+            <a:r>
+              <a:rPr lang="en-US" dirty="0"/>
+              <a:t>Product Name and Distributor</a:t>
+            </a:r>
           </a:p>
           <a:p>
             <a:pPr marL="457200" lvl="1" indent="0">
@@ -16392,114 +16493,114 @@
                                   </p:childTnLst>
                                 </p:cTn>
                               </p:par>
+                              <p:par>
+                                <p:cTn id="40" presetID="42" presetClass="entr" presetSubtype="0" fill="hold" grpId="0" nodeType="withEffect">
+                                  <p:stCondLst>
+                                    <p:cond delay="0"/>
+                                  </p:stCondLst>
+                                  <p:childTnLst>
+                                    <p:set>
+                                      <p:cBhvr>
+                                        <p:cTn id="41" dur="1" fill="hold">
+                                          <p:stCondLst>
+                                            <p:cond delay="0"/>
+                                          </p:stCondLst>
+                                        </p:cTn>
+                                        <p:tgtEl>
+                                          <p:spTgt spid="3">
+                                            <p:txEl>
+                                              <p:pRg st="5" end="5"/>
+                                            </p:txEl>
+                                          </p:spTgt>
+                                        </p:tgtEl>
+                                        <p:attrNameLst>
+                                          <p:attrName>style.visibility</p:attrName>
+                                        </p:attrNameLst>
+                                      </p:cBhvr>
+                                      <p:to>
+                                        <p:strVal val="visible"/>
+                                      </p:to>
+                                    </p:set>
+                                    <p:animEffect transition="in" filter="fade">
+                                      <p:cBhvr>
+                                        <p:cTn id="42" dur="750"/>
+                                        <p:tgtEl>
+                                          <p:spTgt spid="3">
+                                            <p:txEl>
+                                              <p:pRg st="5" end="5"/>
+                                            </p:txEl>
+                                          </p:spTgt>
+                                        </p:tgtEl>
+                                      </p:cBhvr>
+                                    </p:animEffect>
+                                    <p:anim calcmode="lin" valueType="num">
+                                      <p:cBhvr>
+                                        <p:cTn id="43" dur="750" fill="hold"/>
+                                        <p:tgtEl>
+                                          <p:spTgt spid="3">
+                                            <p:txEl>
+                                              <p:pRg st="5" end="5"/>
+                                            </p:txEl>
+                                          </p:spTgt>
+                                        </p:tgtEl>
+                                        <p:attrNameLst>
+                                          <p:attrName>ppt_x</p:attrName>
+                                        </p:attrNameLst>
+                                      </p:cBhvr>
+                                      <p:tavLst>
+                                        <p:tav tm="0">
+                                          <p:val>
+                                            <p:strVal val="#ppt_x"/>
+                                          </p:val>
+                                        </p:tav>
+                                        <p:tav tm="100000">
+                                          <p:val>
+                                            <p:strVal val="#ppt_x"/>
+                                          </p:val>
+                                        </p:tav>
+                                      </p:tavLst>
+                                    </p:anim>
+                                    <p:anim calcmode="lin" valueType="num">
+                                      <p:cBhvr>
+                                        <p:cTn id="44" dur="750" fill="hold"/>
+                                        <p:tgtEl>
+                                          <p:spTgt spid="3">
+                                            <p:txEl>
+                                              <p:pRg st="5" end="5"/>
+                                            </p:txEl>
+                                          </p:spTgt>
+                                        </p:tgtEl>
+                                        <p:attrNameLst>
+                                          <p:attrName>ppt_y</p:attrName>
+                                        </p:attrNameLst>
+                                      </p:cBhvr>
+                                      <p:tavLst>
+                                        <p:tav tm="0">
+                                          <p:val>
+                                            <p:strVal val="#ppt_y+.1"/>
+                                          </p:val>
+                                        </p:tav>
+                                        <p:tav tm="100000">
+                                          <p:val>
+                                            <p:strVal val="#ppt_y"/>
+                                          </p:val>
+                                        </p:tav>
+                                      </p:tavLst>
+                                    </p:anim>
+                                  </p:childTnLst>
+                                </p:cTn>
+                              </p:par>
                             </p:childTnLst>
                           </p:cTn>
                         </p:par>
                         <p:par>
-                          <p:cTn id="40" fill="hold">
+                          <p:cTn id="45" fill="hold">
                             <p:stCondLst>
                               <p:cond delay="2250"/>
                             </p:stCondLst>
                             <p:childTnLst>
                               <p:par>
-                                <p:cTn id="41" presetID="42" presetClass="entr" presetSubtype="0" fill="hold" grpId="0" nodeType="afterEffect">
-                                  <p:stCondLst>
-                                    <p:cond delay="0"/>
-                                  </p:stCondLst>
-                                  <p:childTnLst>
-                                    <p:set>
-                                      <p:cBhvr>
-                                        <p:cTn id="42" dur="1" fill="hold">
-                                          <p:stCondLst>
-                                            <p:cond delay="0"/>
-                                          </p:stCondLst>
-                                        </p:cTn>
-                                        <p:tgtEl>
-                                          <p:spTgt spid="3">
-                                            <p:txEl>
-                                              <p:pRg st="5" end="5"/>
-                                            </p:txEl>
-                                          </p:spTgt>
-                                        </p:tgtEl>
-                                        <p:attrNameLst>
-                                          <p:attrName>style.visibility</p:attrName>
-                                        </p:attrNameLst>
-                                      </p:cBhvr>
-                                      <p:to>
-                                        <p:strVal val="visible"/>
-                                      </p:to>
-                                    </p:set>
-                                    <p:animEffect transition="in" filter="fade">
-                                      <p:cBhvr>
-                                        <p:cTn id="43" dur="750"/>
-                                        <p:tgtEl>
-                                          <p:spTgt spid="3">
-                                            <p:txEl>
-                                              <p:pRg st="5" end="5"/>
-                                            </p:txEl>
-                                          </p:spTgt>
-                                        </p:tgtEl>
-                                      </p:cBhvr>
-                                    </p:animEffect>
-                                    <p:anim calcmode="lin" valueType="num">
-                                      <p:cBhvr>
-                                        <p:cTn id="44" dur="750" fill="hold"/>
-                                        <p:tgtEl>
-                                          <p:spTgt spid="3">
-                                            <p:txEl>
-                                              <p:pRg st="5" end="5"/>
-                                            </p:txEl>
-                                          </p:spTgt>
-                                        </p:tgtEl>
-                                        <p:attrNameLst>
-                                          <p:attrName>ppt_x</p:attrName>
-                                        </p:attrNameLst>
-                                      </p:cBhvr>
-                                      <p:tavLst>
-                                        <p:tav tm="0">
-                                          <p:val>
-                                            <p:strVal val="#ppt_x"/>
-                                          </p:val>
-                                        </p:tav>
-                                        <p:tav tm="100000">
-                                          <p:val>
-                                            <p:strVal val="#ppt_x"/>
-                                          </p:val>
-                                        </p:tav>
-                                      </p:tavLst>
-                                    </p:anim>
-                                    <p:anim calcmode="lin" valueType="num">
-                                      <p:cBhvr>
-                                        <p:cTn id="45" dur="750" fill="hold"/>
-                                        <p:tgtEl>
-                                          <p:spTgt spid="3">
-                                            <p:txEl>
-                                              <p:pRg st="5" end="5"/>
-                                            </p:txEl>
-                                          </p:spTgt>
-                                        </p:tgtEl>
-                                        <p:attrNameLst>
-                                          <p:attrName>ppt_y</p:attrName>
-                                        </p:attrNameLst>
-                                      </p:cBhvr>
-                                      <p:tavLst>
-                                        <p:tav tm="0">
-                                          <p:val>
-                                            <p:strVal val="#ppt_y+.1"/>
-                                          </p:val>
-                                        </p:tav>
-                                        <p:tav tm="100000">
-                                          <p:val>
-                                            <p:strVal val="#ppt_y"/>
-                                          </p:val>
-                                        </p:tav>
-                                      </p:tavLst>
-                                    </p:anim>
-                                  </p:childTnLst>
-                                </p:cTn>
-                              </p:par>
-                              <p:par>
-                                <p:cTn id="46" presetID="42" presetClass="entr" presetSubtype="0" fill="hold" grpId="0" nodeType="withEffect">
+                                <p:cTn id="46" presetID="42" presetClass="entr" presetSubtype="0" fill="hold" grpId="0" nodeType="afterEffect">
                                   <p:stCondLst>
                                     <p:cond delay="0"/>
                                   </p:stCondLst>
@@ -16789,24 +16890,121 @@
                                   </p:childTnLst>
                                 </p:cTn>
                               </p:par>
+                              <p:par>
+                                <p:cTn id="61" presetID="42" presetClass="entr" presetSubtype="0" fill="hold" grpId="0" nodeType="withEffect">
+                                  <p:stCondLst>
+                                    <p:cond delay="0"/>
+                                  </p:stCondLst>
+                                  <p:childTnLst>
+                                    <p:set>
+                                      <p:cBhvr>
+                                        <p:cTn id="62" dur="1" fill="hold">
+                                          <p:stCondLst>
+                                            <p:cond delay="0"/>
+                                          </p:stCondLst>
+                                        </p:cTn>
+                                        <p:tgtEl>
+                                          <p:spTgt spid="3">
+                                            <p:txEl>
+                                              <p:pRg st="9" end="9"/>
+                                            </p:txEl>
+                                          </p:spTgt>
+                                        </p:tgtEl>
+                                        <p:attrNameLst>
+                                          <p:attrName>style.visibility</p:attrName>
+                                        </p:attrNameLst>
+                                      </p:cBhvr>
+                                      <p:to>
+                                        <p:strVal val="visible"/>
+                                      </p:to>
+                                    </p:set>
+                                    <p:animEffect transition="in" filter="fade">
+                                      <p:cBhvr>
+                                        <p:cTn id="63" dur="750"/>
+                                        <p:tgtEl>
+                                          <p:spTgt spid="3">
+                                            <p:txEl>
+                                              <p:pRg st="9" end="9"/>
+                                            </p:txEl>
+                                          </p:spTgt>
+                                        </p:tgtEl>
+                                      </p:cBhvr>
+                                    </p:animEffect>
+                                    <p:anim calcmode="lin" valueType="num">
+                                      <p:cBhvr>
+                                        <p:cTn id="64" dur="750" fill="hold"/>
+                                        <p:tgtEl>
+                                          <p:spTgt spid="3">
+                                            <p:txEl>
+                                              <p:pRg st="9" end="9"/>
+                                            </p:txEl>
+                                          </p:spTgt>
+                                        </p:tgtEl>
+                                        <p:attrNameLst>
+                                          <p:attrName>ppt_x</p:attrName>
+                                        </p:attrNameLst>
+                                      </p:cBhvr>
+                                      <p:tavLst>
+                                        <p:tav tm="0">
+                                          <p:val>
+                                            <p:strVal val="#ppt_x"/>
+                                          </p:val>
+                                        </p:tav>
+                                        <p:tav tm="100000">
+                                          <p:val>
+                                            <p:strVal val="#ppt_x"/>
+                                          </p:val>
+                                        </p:tav>
+                                      </p:tavLst>
+                                    </p:anim>
+                                    <p:anim calcmode="lin" valueType="num">
+                                      <p:cBhvr>
+                                        <p:cTn id="65" dur="750" fill="hold"/>
+                                        <p:tgtEl>
+                                          <p:spTgt spid="3">
+                                            <p:txEl>
+                                              <p:pRg st="9" end="9"/>
+                                            </p:txEl>
+                                          </p:spTgt>
+                                        </p:tgtEl>
+                                        <p:attrNameLst>
+                                          <p:attrName>ppt_y</p:attrName>
+                                        </p:attrNameLst>
+                                      </p:cBhvr>
+                                      <p:tavLst>
+                                        <p:tav tm="0">
+                                          <p:val>
+                                            <p:strVal val="#ppt_y+.1"/>
+                                          </p:val>
+                                        </p:tav>
+                                        <p:tav tm="100000">
+                                          <p:val>
+                                            <p:strVal val="#ppt_y"/>
+                                          </p:val>
+                                        </p:tav>
+                                      </p:tavLst>
+                                    </p:anim>
+                                  </p:childTnLst>
+                                </p:cTn>
+                              </p:par>
                             </p:childTnLst>
                           </p:cTn>
                         </p:par>
                         <p:par>
-                          <p:cTn id="61" fill="hold">
+                          <p:cTn id="66" fill="hold">
                             <p:stCondLst>
                               <p:cond delay="3000"/>
                             </p:stCondLst>
                             <p:childTnLst>
                               <p:par>
-                                <p:cTn id="62" presetID="42" presetClass="entr" presetSubtype="0" fill="hold" grpId="0" nodeType="afterEffect">
+                                <p:cTn id="67" presetID="42" presetClass="entr" presetSubtype="0" fill="hold" grpId="0" nodeType="afterEffect">
                                   <p:stCondLst>
                                     <p:cond delay="0"/>
                                   </p:stCondLst>
                                   <p:childTnLst>
                                     <p:set>
                                       <p:cBhvr>
-                                        <p:cTn id="63" dur="1" fill="hold">
+                                        <p:cTn id="68" dur="1" fill="hold">
                                           <p:stCondLst>
                                             <p:cond delay="0"/>
                                           </p:stCondLst>
@@ -16814,7 +17012,7 @@
                                         <p:tgtEl>
                                           <p:spTgt spid="3">
                                             <p:txEl>
-                                              <p:pRg st="9" end="9"/>
+                                              <p:pRg st="10" end="10"/>
                                             </p:txEl>
                                           </p:spTgt>
                                         </p:tgtEl>
@@ -16828,11 +17026,11 @@
                                     </p:set>
                                     <p:animEffect transition="in" filter="fade">
                                       <p:cBhvr>
-                                        <p:cTn id="64" dur="750"/>
+                                        <p:cTn id="69" dur="750"/>
                                         <p:tgtEl>
                                           <p:spTgt spid="3">
                                             <p:txEl>
-                                              <p:pRg st="9" end="9"/>
+                                              <p:pRg st="10" end="10"/>
                                             </p:txEl>
                                           </p:spTgt>
                                         </p:tgtEl>
@@ -16840,11 +17038,11 @@
                                     </p:animEffect>
                                     <p:anim calcmode="lin" valueType="num">
                                       <p:cBhvr>
-                                        <p:cTn id="65" dur="750" fill="hold"/>
+                                        <p:cTn id="70" dur="750" fill="hold"/>
                                         <p:tgtEl>
                                           <p:spTgt spid="3">
                                             <p:txEl>
-                                              <p:pRg st="9" end="9"/>
+                                              <p:pRg st="10" end="10"/>
                                             </p:txEl>
                                           </p:spTgt>
                                         </p:tgtEl>
@@ -16867,11 +17065,11 @@
                                     </p:anim>
                                     <p:anim calcmode="lin" valueType="num">
                                       <p:cBhvr>
-                                        <p:cTn id="66" dur="750" fill="hold"/>
+                                        <p:cTn id="71" dur="750" fill="hold"/>
                                         <p:tgtEl>
                                           <p:spTgt spid="3">
                                             <p:txEl>
-                                              <p:pRg st="9" end="9"/>
+                                              <p:pRg st="10" end="10"/>
                                             </p:txEl>
                                           </p:spTgt>
                                         </p:tgtEl>
@@ -16896,14 +17094,14 @@
                                 </p:cTn>
                               </p:par>
                               <p:par>
-                                <p:cTn id="67" presetID="21" presetClass="entr" presetSubtype="1" fill="hold" nodeType="withEffect">
+                                <p:cTn id="72" presetID="21" presetClass="entr" presetSubtype="1" fill="hold" nodeType="withEffect">
                                   <p:stCondLst>
                                     <p:cond delay="0"/>
                                   </p:stCondLst>
                                   <p:childTnLst>
                                     <p:set>
                                       <p:cBhvr>
-                                        <p:cTn id="68" dur="1" fill="hold">
+                                        <p:cTn id="73" dur="1" fill="hold">
                                           <p:stCondLst>
                                             <p:cond delay="0"/>
                                           </p:stCondLst>
@@ -16921,7 +17119,7 @@
                                     </p:set>
                                     <p:animEffect transition="in" filter="wheel(1)">
                                       <p:cBhvr>
-                                        <p:cTn id="69" dur="1000"/>
+                                        <p:cTn id="74" dur="1000"/>
                                         <p:tgtEl>
                                           <p:spTgt spid="5"/>
                                         </p:tgtEl>
@@ -16994,7 +17192,7 @@
         </p:nvSpPr>
         <p:spPr>
           <a:xfrm>
-            <a:off x="1293812" y="609600"/>
+            <a:off x="1065212" y="741350"/>
             <a:ext cx="6324600" cy="609600"/>
           </a:xfrm>
         </p:spPr>
@@ -17033,8 +17231,8 @@
         </p:nvSpPr>
         <p:spPr>
           <a:xfrm>
-            <a:off x="1078318" y="1752600"/>
-            <a:ext cx="4572000" cy="3962400"/>
+            <a:off x="1065212" y="1600200"/>
+            <a:ext cx="5105400" cy="4800600"/>
           </a:xfrm>
         </p:spPr>
         <p:txBody>
@@ -17091,7 +17289,20 @@
                   <a:schemeClr val="tx1"/>
                 </a:solidFill>
               </a:rPr>
-              <a:t>Employee hours worked per quarter</a:t>
+              <a:t>Employee Names and Departments</a:t>
+            </a:r>
+          </a:p>
+          <a:p>
+            <a:pPr marL="457200" lvl="1" indent="0">
+              <a:buNone/>
+            </a:pPr>
+            <a:r>
+              <a:rPr lang="en-US" sz="1500" dirty="0">
+                <a:solidFill>
+                  <a:schemeClr val="tx1"/>
+                </a:solidFill>
+              </a:rPr>
+              <a:t>Employee hours worked per quarter. Hours may seem low as this is a prototype</a:t>
             </a:r>
           </a:p>
           <a:p>
@@ -17155,11 +17366,14 @@
             <a:pPr marL="457200" lvl="1" indent="0">
               <a:buNone/>
             </a:pPr>
-            <a:endParaRPr lang="en-US" sz="1500" dirty="0">
-              <a:solidFill>
-                <a:schemeClr val="tx1"/>
-              </a:solidFill>
-            </a:endParaRPr>
+            <a:r>
+              <a:rPr lang="en-US" sz="1500" dirty="0">
+                <a:solidFill>
+                  <a:schemeClr val="tx1"/>
+                </a:solidFill>
+              </a:rPr>
+              <a:t>Forecasting for quarterly/yearly overhead costs</a:t>
+            </a:r>
           </a:p>
           <a:p>
             <a:pPr marL="45720" indent="0">
@@ -17874,24 +18088,15 @@
                                   </p:childTnLst>
                                 </p:cTn>
                               </p:par>
-                            </p:childTnLst>
-                          </p:cTn>
-                        </p:par>
-                        <p:par>
-                          <p:cTn id="34" fill="hold">
-                            <p:stCondLst>
-                              <p:cond delay="1500"/>
-                            </p:stCondLst>
-                            <p:childTnLst>
                               <p:par>
-                                <p:cTn id="35" presetID="42" presetClass="entr" presetSubtype="0" fill="hold" grpId="0" nodeType="afterEffect">
+                                <p:cTn id="34" presetID="42" presetClass="entr" presetSubtype="0" fill="hold" grpId="0" nodeType="withEffect">
                                   <p:stCondLst>
                                     <p:cond delay="0"/>
                                   </p:stCondLst>
                                   <p:childTnLst>
                                     <p:set>
                                       <p:cBhvr>
-                                        <p:cTn id="36" dur="1" fill="hold">
+                                        <p:cTn id="35" dur="1" fill="hold">
                                           <p:stCondLst>
                                             <p:cond delay="0"/>
                                           </p:stCondLst>
@@ -17913,7 +18118,7 @@
                                     </p:set>
                                     <p:animEffect transition="in" filter="fade">
                                       <p:cBhvr>
-                                        <p:cTn id="37" dur="750"/>
+                                        <p:cTn id="36" dur="750"/>
                                         <p:tgtEl>
                                           <p:spTgt spid="57">
                                             <p:txEl>
@@ -17925,7 +18130,7 @@
                                     </p:animEffect>
                                     <p:anim calcmode="lin" valueType="num">
                                       <p:cBhvr>
-                                        <p:cTn id="38" dur="750" fill="hold"/>
+                                        <p:cTn id="37" dur="750" fill="hold"/>
                                         <p:tgtEl>
                                           <p:spTgt spid="57">
                                             <p:txEl>
@@ -17952,7 +18157,7 @@
                                     </p:anim>
                                     <p:anim calcmode="lin" valueType="num">
                                       <p:cBhvr>
-                                        <p:cTn id="39" dur="750" fill="hold"/>
+                                        <p:cTn id="38" dur="750" fill="hold"/>
                                         <p:tgtEl>
                                           <p:spTgt spid="57">
                                             <p:txEl>
@@ -17984,20 +18189,126 @@
                           </p:cTn>
                         </p:par>
                         <p:par>
-                          <p:cTn id="40" fill="hold">
+                          <p:cTn id="39" fill="hold">
+                            <p:stCondLst>
+                              <p:cond delay="1500"/>
+                            </p:stCondLst>
+                            <p:childTnLst>
+                              <p:par>
+                                <p:cTn id="40" presetID="42" presetClass="entr" presetSubtype="0" fill="hold" grpId="0" nodeType="afterEffect">
+                                  <p:stCondLst>
+                                    <p:cond delay="0"/>
+                                  </p:stCondLst>
+                                  <p:childTnLst>
+                                    <p:set>
+                                      <p:cBhvr>
+                                        <p:cTn id="41" dur="1" fill="hold">
+                                          <p:stCondLst>
+                                            <p:cond delay="0"/>
+                                          </p:stCondLst>
+                                        </p:cTn>
+                                        <p:tgtEl>
+                                          <p:spTgt spid="57">
+                                            <p:txEl>
+                                              <p:pRg st="5" end="5"/>
+                                            </p:txEl>
+                                          </p:spTgt>
+                                        </p:tgtEl>
+                                        <p:attrNameLst>
+                                          <p:attrName>style.visibility</p:attrName>
+                                        </p:attrNameLst>
+                                      </p:cBhvr>
+                                      <p:to>
+                                        <p:strVal val="visible"/>
+                                      </p:to>
+                                    </p:set>
+                                    <p:animEffect transition="in" filter="fade">
+                                      <p:cBhvr>
+                                        <p:cTn id="42" dur="750"/>
+                                        <p:tgtEl>
+                                          <p:spTgt spid="57">
+                                            <p:txEl>
+                                              <p:pRg st="5" end="5"/>
+                                            </p:txEl>
+                                          </p:spTgt>
+                                        </p:tgtEl>
+                                      </p:cBhvr>
+                                    </p:animEffect>
+                                    <p:anim calcmode="lin" valueType="num">
+                                      <p:cBhvr>
+                                        <p:cTn id="43" dur="750" fill="hold"/>
+                                        <p:tgtEl>
+                                          <p:spTgt spid="57">
+                                            <p:txEl>
+                                              <p:pRg st="5" end="5"/>
+                                            </p:txEl>
+                                          </p:spTgt>
+                                        </p:tgtEl>
+                                        <p:attrNameLst>
+                                          <p:attrName>ppt_x</p:attrName>
+                                        </p:attrNameLst>
+                                      </p:cBhvr>
+                                      <p:tavLst>
+                                        <p:tav tm="0">
+                                          <p:val>
+                                            <p:strVal val="#ppt_x"/>
+                                          </p:val>
+                                        </p:tav>
+                                        <p:tav tm="100000">
+                                          <p:val>
+                                            <p:strVal val="#ppt_x"/>
+                                          </p:val>
+                                        </p:tav>
+                                      </p:tavLst>
+                                    </p:anim>
+                                    <p:anim calcmode="lin" valueType="num">
+                                      <p:cBhvr>
+                                        <p:cTn id="44" dur="750" fill="hold"/>
+                                        <p:tgtEl>
+                                          <p:spTgt spid="57">
+                                            <p:txEl>
+                                              <p:pRg st="5" end="5"/>
+                                            </p:txEl>
+                                          </p:spTgt>
+                                        </p:tgtEl>
+                                        <p:attrNameLst>
+                                          <p:attrName>ppt_y</p:attrName>
+                                        </p:attrNameLst>
+                                      </p:cBhvr>
+                                      <p:tavLst>
+                                        <p:tav tm="0">
+                                          <p:val>
+                                            <p:strVal val="#ppt_y+.1"/>
+                                          </p:val>
+                                        </p:tav>
+                                        <p:tav tm="100000">
+                                          <p:val>
+                                            <p:strVal val="#ppt_y"/>
+                                          </p:val>
+                                        </p:tav>
+                                      </p:tavLst>
+                                    </p:anim>
+                                  </p:childTnLst>
+                                </p:cTn>
+                              </p:par>
+                            </p:childTnLst>
+                          </p:cTn>
+                        </p:par>
+                        <p:par>
+                          <p:cTn id="45" fill="hold">
                             <p:stCondLst>
                               <p:cond delay="2250"/>
                             </p:stCondLst>
                             <p:childTnLst>
                               <p:par>
-                                <p:cTn id="41" presetID="10" presetClass="entr" presetSubtype="0" fill="hold" nodeType="afterEffect">
+                                <p:cTn id="46" presetID="10" presetClass="entr" presetSubtype="0" fill="hold" nodeType="afterEffect">
                                   <p:stCondLst>
                                     <p:cond delay="0"/>
                                   </p:stCondLst>
                                   <p:childTnLst>
                                     <p:set>
                                       <p:cBhvr>
-                                        <p:cTn id="42" dur="1" fill="hold">
+                                        <p:cTn id="47" dur="1" fill="hold">
                                           <p:stCondLst>
                                             <p:cond delay="0"/>
                                           </p:stCondLst>
@@ -18015,109 +18326,12 @@
                                     </p:set>
                                     <p:animEffect transition="in" filter="fade">
                                       <p:cBhvr>
-                                        <p:cTn id="43" dur="750"/>
+                                        <p:cTn id="48" dur="750"/>
                                         <p:tgtEl>
                                           <p:spTgt spid="8"/>
                                         </p:tgtEl>
                                       </p:cBhvr>
                                     </p:animEffect>
-                                  </p:childTnLst>
-                                </p:cTn>
-                              </p:par>
-                              <p:par>
-                                <p:cTn id="44" presetID="42" presetClass="entr" presetSubtype="0" fill="hold" grpId="0" nodeType="withEffect">
-                                  <p:stCondLst>
-                                    <p:cond delay="0"/>
-                                  </p:stCondLst>
-                                  <p:childTnLst>
-                                    <p:set>
-                                      <p:cBhvr>
-                                        <p:cTn id="45" dur="1" fill="hold">
-                                          <p:stCondLst>
-                                            <p:cond delay="0"/>
-                                          </p:stCondLst>
-                                        </p:cTn>
-                                        <p:tgtEl>
-                                          <p:spTgt spid="57">
-                                            <p:txEl>
-                                              <p:pRg st="5" end="5"/>
-                                            </p:txEl>
-                                          </p:spTgt>
-                                        </p:tgtEl>
-                                        <p:attrNameLst>
-                                          <p:attrName>style.visibility</p:attrName>
-                                        </p:attrNameLst>
-                                      </p:cBhvr>
-                                      <p:to>
-                                        <p:strVal val="visible"/>
-                                      </p:to>
-                                    </p:set>
-                                    <p:animEffect transition="in" filter="fade">
-                                      <p:cBhvr>
-                                        <p:cTn id="46" dur="750"/>
-                                        <p:tgtEl>
-                                          <p:spTgt spid="57">
-                                            <p:txEl>
-                                              <p:pRg st="5" end="5"/>
-                                            </p:txEl>
-                                          </p:spTgt>
-                                        </p:tgtEl>
-                                      </p:cBhvr>
-                                    </p:animEffect>
-                                    <p:anim calcmode="lin" valueType="num">
-                                      <p:cBhvr>
-                                        <p:cTn id="47" dur="750" fill="hold"/>
-                                        <p:tgtEl>
-                                          <p:spTgt spid="57">
-                                            <p:txEl>
-                                              <p:pRg st="5" end="5"/>
-                                            </p:txEl>
-                                          </p:spTgt>
-                                        </p:tgtEl>
-                                        <p:attrNameLst>
-                                          <p:attrName>ppt_x</p:attrName>
-                                        </p:attrNameLst>
-                                      </p:cBhvr>
-                                      <p:tavLst>
-                                        <p:tav tm="0">
-                                          <p:val>
-                                            <p:strVal val="#ppt_x"/>
-                                          </p:val>
-                                        </p:tav>
-                                        <p:tav tm="100000">
-                                          <p:val>
-                                            <p:strVal val="#ppt_x"/>
-                                          </p:val>
-                                        </p:tav>
-                                      </p:tavLst>
-                                    </p:anim>
-                                    <p:anim calcmode="lin" valueType="num">
-                                      <p:cBhvr>
-                                        <p:cTn id="48" dur="750" fill="hold"/>
-                                        <p:tgtEl>
-                                          <p:spTgt spid="57">
-                                            <p:txEl>
-                                              <p:pRg st="5" end="5"/>
-                                            </p:txEl>
-                                          </p:spTgt>
-                                        </p:tgtEl>
-                                        <p:attrNameLst>
-                                          <p:attrName>ppt_y</p:attrName>
-                                        </p:attrNameLst>
-                                      </p:cBhvr>
-                                      <p:tavLst>
-                                        <p:tav tm="0">
-                                          <p:val>
-                                            <p:strVal val="#ppt_y+.1"/>
-                                          </p:val>
-                                        </p:tav>
-                                        <p:tav tm="100000">
-                                          <p:val>
-                                            <p:strVal val="#ppt_y"/>
-                                          </p:val>
-                                        </p:tav>
-                                      </p:tavLst>
-                                    </p:anim>
                                   </p:childTnLst>
                                 </p:cTn>
                               </p:par>
@@ -18218,24 +18432,15 @@
                                   </p:childTnLst>
                                 </p:cTn>
                               </p:par>
-                            </p:childTnLst>
-                          </p:cTn>
-                        </p:par>
-                        <p:par>
-                          <p:cTn id="54" fill="hold">
-                            <p:stCondLst>
-                              <p:cond delay="3000"/>
-                            </p:stCondLst>
-                            <p:childTnLst>
                               <p:par>
-                                <p:cTn id="55" presetID="42" presetClass="entr" presetSubtype="0" fill="hold" grpId="0" nodeType="afterEffect">
+                                <p:cTn id="54" presetID="42" presetClass="entr" presetSubtype="0" fill="hold" grpId="0" nodeType="withEffect">
                                   <p:stCondLst>
                                     <p:cond delay="0"/>
                                   </p:stCondLst>
                                   <p:childTnLst>
                                     <p:set>
                                       <p:cBhvr>
-                                        <p:cTn id="56" dur="1" fill="hold">
+                                        <p:cTn id="55" dur="1" fill="hold">
                                           <p:stCondLst>
                                             <p:cond delay="0"/>
                                           </p:stCondLst>
@@ -18243,7 +18448,7 @@
                                         <p:tgtEl>
                                           <p:spTgt spid="57">
                                             <p:txEl>
-                                              <p:pRg st="8" end="8"/>
+                                              <p:pRg st="7" end="7"/>
                                             </p:txEl>
                                           </p:spTgt>
                                         </p:tgtEl>
@@ -18257,11 +18462,11 @@
                                     </p:set>
                                     <p:animEffect transition="in" filter="fade">
                                       <p:cBhvr>
-                                        <p:cTn id="57" dur="750"/>
+                                        <p:cTn id="56" dur="750"/>
                                         <p:tgtEl>
                                           <p:spTgt spid="57">
                                             <p:txEl>
-                                              <p:pRg st="8" end="8"/>
+                                              <p:pRg st="7" end="7"/>
                                             </p:txEl>
                                           </p:spTgt>
                                         </p:tgtEl>
@@ -18269,11 +18474,11 @@
                                     </p:animEffect>
                                     <p:anim calcmode="lin" valueType="num">
                                       <p:cBhvr>
-                                        <p:cTn id="58" dur="750" fill="hold"/>
+                                        <p:cTn id="57" dur="750" fill="hold"/>
                                         <p:tgtEl>
                                           <p:spTgt spid="57">
                                             <p:txEl>
-                                              <p:pRg st="8" end="8"/>
+                                              <p:pRg st="7" end="7"/>
                                             </p:txEl>
                                           </p:spTgt>
                                         </p:tgtEl>
@@ -18296,11 +18501,11 @@
                                     </p:anim>
                                     <p:anim calcmode="lin" valueType="num">
                                       <p:cBhvr>
-                                        <p:cTn id="59" dur="750" fill="hold"/>
+                                        <p:cTn id="58" dur="750" fill="hold"/>
                                         <p:tgtEl>
                                           <p:spTgt spid="57">
                                             <p:txEl>
-                                              <p:pRg st="8" end="8"/>
+                                              <p:pRg st="7" end="7"/>
                                             </p:txEl>
                                           </p:spTgt>
                                         </p:tgtEl>
@@ -18325,14 +18530,217 @@
                                 </p:cTn>
                               </p:par>
                               <p:par>
-                                <p:cTn id="60" presetID="16" presetClass="entr" presetSubtype="21" fill="hold" nodeType="withEffect">
+                                <p:cTn id="59" presetID="42" presetClass="entr" presetSubtype="0" fill="hold" grpId="0" nodeType="withEffect">
                                   <p:stCondLst>
                                     <p:cond delay="0"/>
                                   </p:stCondLst>
                                   <p:childTnLst>
                                     <p:set>
                                       <p:cBhvr>
-                                        <p:cTn id="61" dur="1" fill="hold">
+                                        <p:cTn id="60" dur="1" fill="hold">
+                                          <p:stCondLst>
+                                            <p:cond delay="0"/>
+                                          </p:stCondLst>
+                                        </p:cTn>
+                                        <p:tgtEl>
+                                          <p:spTgt spid="57">
+                                            <p:txEl>
+                                              <p:pRg st="8" end="8"/>
+                                            </p:txEl>
+                                          </p:spTgt>
+                                        </p:tgtEl>
+                                        <p:attrNameLst>
+                                          <p:attrName>style.visibility</p:attrName>
+                                        </p:attrNameLst>
+                                      </p:cBhvr>
+                                      <p:to>
+                                        <p:strVal val="visible"/>
+                                      </p:to>
+                                    </p:set>
+                                    <p:animEffect transition="in" filter="fade">
+                                      <p:cBhvr>
+                                        <p:cTn id="61" dur="750"/>
+                                        <p:tgtEl>
+                                          <p:spTgt spid="57">
+                                            <p:txEl>
+                                              <p:pRg st="8" end="8"/>
+                                            </p:txEl>
+                                          </p:spTgt>
+                                        </p:tgtEl>
+                                      </p:cBhvr>
+                                    </p:animEffect>
+                                    <p:anim calcmode="lin" valueType="num">
+                                      <p:cBhvr>
+                                        <p:cTn id="62" dur="750" fill="hold"/>
+                                        <p:tgtEl>
+                                          <p:spTgt spid="57">
+                                            <p:txEl>
+                                              <p:pRg st="8" end="8"/>
+                                            </p:txEl>
+                                          </p:spTgt>
+                                        </p:tgtEl>
+                                        <p:attrNameLst>
+                                          <p:attrName>ppt_x</p:attrName>
+                                        </p:attrNameLst>
+                                      </p:cBhvr>
+                                      <p:tavLst>
+                                        <p:tav tm="0">
+                                          <p:val>
+                                            <p:strVal val="#ppt_x"/>
+                                          </p:val>
+                                        </p:tav>
+                                        <p:tav tm="100000">
+                                          <p:val>
+                                            <p:strVal val="#ppt_x"/>
+                                          </p:val>
+                                        </p:tav>
+                                      </p:tavLst>
+                                    </p:anim>
+                                    <p:anim calcmode="lin" valueType="num">
+                                      <p:cBhvr>
+                                        <p:cTn id="63" dur="750" fill="hold"/>
+                                        <p:tgtEl>
+                                          <p:spTgt spid="57">
+                                            <p:txEl>
+                                              <p:pRg st="8" end="8"/>
+                                            </p:txEl>
+                                          </p:spTgt>
+                                        </p:tgtEl>
+                                        <p:attrNameLst>
+                                          <p:attrName>ppt_y</p:attrName>
+                                        </p:attrNameLst>
+                                      </p:cBhvr>
+                                      <p:tavLst>
+                                        <p:tav tm="0">
+                                          <p:val>
+                                            <p:strVal val="#ppt_y+.1"/>
+                                          </p:val>
+                                        </p:tav>
+                                        <p:tav tm="100000">
+                                          <p:val>
+                                            <p:strVal val="#ppt_y"/>
+                                          </p:val>
+                                        </p:tav>
+                                      </p:tavLst>
+                                    </p:anim>
+                                  </p:childTnLst>
+                                </p:cTn>
+                              </p:par>
+                            </p:childTnLst>
+                          </p:cTn>
+                        </p:par>
+                        <p:par>
+                          <p:cTn id="64" fill="hold">
+                            <p:stCondLst>
+                              <p:cond delay="3000"/>
+                            </p:stCondLst>
+                            <p:childTnLst>
+                              <p:par>
+                                <p:cTn id="65" presetID="42" presetClass="entr" presetSubtype="0" fill="hold" grpId="0" nodeType="afterEffect">
+                                  <p:stCondLst>
+                                    <p:cond delay="0"/>
+                                  </p:stCondLst>
+                                  <p:childTnLst>
+                                    <p:set>
+                                      <p:cBhvr>
+                                        <p:cTn id="66" dur="1" fill="hold">
+                                          <p:stCondLst>
+                                            <p:cond delay="0"/>
+                                          </p:stCondLst>
+                                        </p:cTn>
+                                        <p:tgtEl>
+                                          <p:spTgt spid="57">
+                                            <p:txEl>
+                                              <p:pRg st="9" end="9"/>
+                                            </p:txEl>
+                                          </p:spTgt>
+                                        </p:tgtEl>
+                                        <p:attrNameLst>
+                                          <p:attrName>style.visibility</p:attrName>
+                                        </p:attrNameLst>
+                                      </p:cBhvr>
+                                      <p:to>
+                                        <p:strVal val="visible"/>
+                                      </p:to>
+                                    </p:set>
+                                    <p:animEffect transition="in" filter="fade">
+                                      <p:cBhvr>
+                                        <p:cTn id="67" dur="750"/>
+                                        <p:tgtEl>
+                                          <p:spTgt spid="57">
+                                            <p:txEl>
+                                              <p:pRg st="9" end="9"/>
+                                            </p:txEl>
+                                          </p:spTgt>
+                                        </p:tgtEl>
+                                      </p:cBhvr>
+                                    </p:animEffect>
+                                    <p:anim calcmode="lin" valueType="num">
+                                      <p:cBhvr>
+                                        <p:cTn id="68" dur="750" fill="hold"/>
+                                        <p:tgtEl>
+                                          <p:spTgt spid="57">
+                                            <p:txEl>
+                                              <p:pRg st="9" end="9"/>
+                                            </p:txEl>
+                                          </p:spTgt>
+                                        </p:tgtEl>
+                                        <p:attrNameLst>
+                                          <p:attrName>ppt_x</p:attrName>
+                                        </p:attrNameLst>
+                                      </p:cBhvr>
+                                      <p:tavLst>
+                                        <p:tav tm="0">
+                                          <p:val>
+                                            <p:strVal val="#ppt_x"/>
+                                          </p:val>
+                                        </p:tav>
+                                        <p:tav tm="100000">
+                                          <p:val>
+                                            <p:strVal val="#ppt_x"/>
+                                          </p:val>
+                                        </p:tav>
+                                      </p:tavLst>
+                                    </p:anim>
+                                    <p:anim calcmode="lin" valueType="num">
+                                      <p:cBhvr>
+                                        <p:cTn id="69" dur="750" fill="hold"/>
+                                        <p:tgtEl>
+                                          <p:spTgt spid="57">
+                                            <p:txEl>
+                                              <p:pRg st="9" end="9"/>
+                                            </p:txEl>
+                                          </p:spTgt>
+                                        </p:tgtEl>
+                                        <p:attrNameLst>
+                                          <p:attrName>ppt_y</p:attrName>
+                                        </p:attrNameLst>
+                                      </p:cBhvr>
+                                      <p:tavLst>
+                                        <p:tav tm="0">
+                                          <p:val>
+                                            <p:strVal val="#ppt_y+.1"/>
+                                          </p:val>
+                                        </p:tav>
+                                        <p:tav tm="100000">
+                                          <p:val>
+                                            <p:strVal val="#ppt_y"/>
+                                          </p:val>
+                                        </p:tav>
+                                      </p:tavLst>
+                                    </p:anim>
+                                  </p:childTnLst>
+                                </p:cTn>
+                              </p:par>
+                              <p:par>
+                                <p:cTn id="70" presetID="16" presetClass="entr" presetSubtype="21" fill="hold" nodeType="withEffect">
+                                  <p:stCondLst>
+                                    <p:cond delay="0"/>
+                                  </p:stCondLst>
+                                  <p:childTnLst>
+                                    <p:set>
+                                      <p:cBhvr>
+                                        <p:cTn id="71" dur="1" fill="hold">
                                           <p:stCondLst>
                                             <p:cond delay="0"/>
                                           </p:stCondLst>
@@ -18350,7 +18758,7 @@
                                     </p:set>
                                     <p:animEffect transition="in" filter="barn(inVertical)">
                                       <p:cBhvr>
-                                        <p:cTn id="62" dur="1000"/>
+                                        <p:cTn id="72" dur="1000"/>
                                         <p:tgtEl>
                                           <p:spTgt spid="4"/>
                                         </p:tgtEl>
@@ -21497,6 +21905,35 @@
 </file>
 
 <file path=customXml/item1.xml><?xml version="1.0" encoding="utf-8"?>
+<p:properties xmlns:p="http://schemas.microsoft.com/office/2006/metadata/properties" xmlns:xsi="http://www.w3.org/2001/XMLSchema-instance" xmlns:pc="http://schemas.microsoft.com/office/infopath/2007/PartnerControls">
+  <documentManagement>
+    <_ip_UnifiedCompliancePolicyUIAction xmlns="http://schemas.microsoft.com/sharepoint/v3" xsi:nil="true"/>
+    <Image xmlns="71af3243-3dd4-4a8d-8c0d-dd76da1f02a5">
+      <Url xsi:nil="true"/>
+      <Description xsi:nil="true"/>
+    </Image>
+    <Status xmlns="71af3243-3dd4-4a8d-8c0d-dd76da1f02a5">Not started</Status>
+    <Background xmlns="71af3243-3dd4-4a8d-8c0d-dd76da1f02a5">false</Background>
+    <_ip_UnifiedCompliancePolicyProperties xmlns="http://schemas.microsoft.com/sharepoint/v3" xsi:nil="true"/>
+    <ImageTagsTaxHTField xmlns="71af3243-3dd4-4a8d-8c0d-dd76da1f02a5">
+      <Terms xmlns="http://schemas.microsoft.com/office/infopath/2007/PartnerControls"/>
+    </ImageTagsTaxHTField>
+    <TaxCatchAll xmlns="230e9df3-be65-4c73-a93b-d1236ebd677e" xsi:nil="true"/>
+    <MediaServiceKeyPoints xmlns="71af3243-3dd4-4a8d-8c0d-dd76da1f02a5" xsi:nil="true"/>
+  </documentManagement>
+</p:properties>
+</file>
+
+<file path=customXml/item2.xml><?xml version="1.0" encoding="utf-8"?>
+<?mso-contentType ?>
+<FormTemplates xmlns="http://schemas.microsoft.com/sharepoint/v3/contenttype/forms">
+  <Display>DocumentLibraryForm</Display>
+  <Edit>DocumentLibraryForm</Edit>
+  <New>DocumentLibraryForm</New>
+</FormTemplates>
+</file>
+
+<file path=customXml/item3.xml><?xml version="1.0" encoding="utf-8"?>
 <ct:contentTypeSchema xmlns:ct="http://schemas.microsoft.com/office/2006/metadata/contentType" xmlns:ma="http://schemas.microsoft.com/office/2006/metadata/properties/metaAttributes" ct:_="" ma:_="" ma:contentTypeName="Document" ma:contentTypeID="0x01010079F111ED35F8CC479449609E8A0923A6" ma:contentTypeVersion="28" ma:contentTypeDescription="Create a new document." ma:contentTypeScope="" ma:versionID="60f5a4f2d2b0abadcf532d48ebf9cb71">
   <xsd:schema xmlns:xsd="http://www.w3.org/2001/XMLSchema" xmlns:xs="http://www.w3.org/2001/XMLSchema" xmlns:p="http://schemas.microsoft.com/office/2006/metadata/properties" xmlns:ns1="http://schemas.microsoft.com/sharepoint/v3" xmlns:ns2="71af3243-3dd4-4a8d-8c0d-dd76da1f02a5" xmlns:ns3="16c05727-aa75-4e4a-9b5f-8a80a1165891" xmlns:ns4="230e9df3-be65-4c73-a93b-d1236ebd677e" targetNamespace="http://schemas.microsoft.com/office/2006/metadata/properties" ma:root="true" ma:fieldsID="7dd78129e6a1811f84807ad11c651531" ns1:_="" ns2:_="" ns3:_="" ns4:_="">
     <xsd:import namespace="http://schemas.microsoft.com/sharepoint/v3"/>
@@ -21808,36 +22245,29 @@
 </ct:contentTypeSchema>
 </file>
 
-<file path=customXml/item2.xml><?xml version="1.0" encoding="utf-8"?>
-<p:properties xmlns:p="http://schemas.microsoft.com/office/2006/metadata/properties" xmlns:xsi="http://www.w3.org/2001/XMLSchema-instance" xmlns:pc="http://schemas.microsoft.com/office/infopath/2007/PartnerControls">
-  <documentManagement>
-    <_ip_UnifiedCompliancePolicyUIAction xmlns="http://schemas.microsoft.com/sharepoint/v3" xsi:nil="true"/>
-    <Image xmlns="71af3243-3dd4-4a8d-8c0d-dd76da1f02a5">
-      <Url xsi:nil="true"/>
-      <Description xsi:nil="true"/>
-    </Image>
-    <Status xmlns="71af3243-3dd4-4a8d-8c0d-dd76da1f02a5">Not started</Status>
-    <Background xmlns="71af3243-3dd4-4a8d-8c0d-dd76da1f02a5">false</Background>
-    <_ip_UnifiedCompliancePolicyProperties xmlns="http://schemas.microsoft.com/sharepoint/v3" xsi:nil="true"/>
-    <ImageTagsTaxHTField xmlns="71af3243-3dd4-4a8d-8c0d-dd76da1f02a5">
-      <Terms xmlns="http://schemas.microsoft.com/office/infopath/2007/PartnerControls"/>
-    </ImageTagsTaxHTField>
-    <TaxCatchAll xmlns="230e9df3-be65-4c73-a93b-d1236ebd677e" xsi:nil="true"/>
-    <MediaServiceKeyPoints xmlns="71af3243-3dd4-4a8d-8c0d-dd76da1f02a5" xsi:nil="true"/>
-  </documentManagement>
-</p:properties>
+<file path=customXml/itemProps1.xml><?xml version="1.0" encoding="utf-8"?>
+<ds:datastoreItem xmlns:ds="http://schemas.openxmlformats.org/officeDocument/2006/customXml" ds:itemID="{AF050606-E255-48B6-AE23-CE03A589EB22}">
+  <ds:schemaRefs>
+    <ds:schemaRef ds:uri="http://schemas.microsoft.com/office/2006/metadata/properties"/>
+    <ds:schemaRef ds:uri="http://www.w3.org/2000/xmlns/"/>
+    <ds:schemaRef ds:uri="http://schemas.microsoft.com/sharepoint/v3"/>
+    <ds:schemaRef ds:uri="http://www.w3.org/2001/XMLSchema-instance"/>
+    <ds:schemaRef ds:uri="71af3243-3dd4-4a8d-8c0d-dd76da1f02a5"/>
+    <ds:schemaRef ds:uri="http://schemas.microsoft.com/office/infopath/2007/PartnerControls"/>
+    <ds:schemaRef ds:uri="230e9df3-be65-4c73-a93b-d1236ebd677e"/>
+  </ds:schemaRefs>
+</ds:datastoreItem>
 </file>
 
-<file path=customXml/item3.xml><?xml version="1.0" encoding="utf-8"?>
-<?mso-contentType ?>
-<FormTemplates xmlns="http://schemas.microsoft.com/sharepoint/v3/contenttype/forms">
-  <Display>DocumentLibraryForm</Display>
-  <Edit>DocumentLibraryForm</Edit>
-  <New>DocumentLibraryForm</New>
-</FormTemplates>
+<file path=customXml/itemProps2.xml><?xml version="1.0" encoding="utf-8"?>
+<ds:datastoreItem xmlns:ds="http://schemas.openxmlformats.org/officeDocument/2006/customXml" ds:itemID="{4C37B52A-9EC8-4B7A-85C4-31F7EAFE403D}">
+  <ds:schemaRefs>
+    <ds:schemaRef ds:uri="http://schemas.microsoft.com/sharepoint/v3/contenttype/forms"/>
+  </ds:schemaRefs>
+</ds:datastoreItem>
 </file>
 
-<file path=customXml/itemProps1.xml><?xml version="1.0" encoding="utf-8"?>
+<file path=customXml/itemProps3.xml><?xml version="1.0" encoding="utf-8"?>
 <ds:datastoreItem xmlns:ds="http://schemas.openxmlformats.org/officeDocument/2006/customXml" ds:itemID="{20C06458-EC9A-428C-9123-A760B9587A60}">
   <ds:schemaRefs>
     <ds:schemaRef ds:uri="http://schemas.microsoft.com/office/2006/metadata/contentType"/>
@@ -21859,28 +22289,6 @@
 </ds:datastoreItem>
 </file>
 
-<file path=customXml/itemProps2.xml><?xml version="1.0" encoding="utf-8"?>
-<ds:datastoreItem xmlns:ds="http://schemas.openxmlformats.org/officeDocument/2006/customXml" ds:itemID="{AF050606-E255-48B6-AE23-CE03A589EB22}">
-  <ds:schemaRefs>
-    <ds:schemaRef ds:uri="http://schemas.microsoft.com/office/2006/metadata/properties"/>
-    <ds:schemaRef ds:uri="http://www.w3.org/2000/xmlns/"/>
-    <ds:schemaRef ds:uri="http://schemas.microsoft.com/sharepoint/v3"/>
-    <ds:schemaRef ds:uri="http://www.w3.org/2001/XMLSchema-instance"/>
-    <ds:schemaRef ds:uri="71af3243-3dd4-4a8d-8c0d-dd76da1f02a5"/>
-    <ds:schemaRef ds:uri="http://schemas.microsoft.com/office/infopath/2007/PartnerControls"/>
-    <ds:schemaRef ds:uri="230e9df3-be65-4c73-a93b-d1236ebd677e"/>
-  </ds:schemaRefs>
-</ds:datastoreItem>
-</file>
-
-<file path=customXml/itemProps3.xml><?xml version="1.0" encoding="utf-8"?>
-<ds:datastoreItem xmlns:ds="http://schemas.openxmlformats.org/officeDocument/2006/customXml" ds:itemID="{4C37B52A-9EC8-4B7A-85C4-31F7EAFE403D}">
-  <ds:schemaRefs>
-    <ds:schemaRef ds:uri="http://schemas.microsoft.com/sharepoint/v3/contenttype/forms"/>
-  </ds:schemaRefs>
-</ds:datastoreItem>
-</file>
-
 <file path=docMetadata/LabelInfo.xml><?xml version="1.0" encoding="utf-8"?>
 <clbl:labelList xmlns:clbl="http://schemas.microsoft.com/office/2020/mipLabelMetadata"/>
 </file>
</xml_diff>